<commit_message>
Fixed arrow in diagram pointing to an already used container.
</commit_message>
<xml_diff>
--- a/orchestra.pptx
+++ b/orchestra.pptx
@@ -5454,13 +5454,14 @@
           <p:cNvPr id="234" name="Curved Connector 233"/>
           <p:cNvCxnSpPr>
             <a:stCxn id="58" idx="2"/>
+            <a:endCxn id="223" idx="1"/>
           </p:cNvCxnSpPr>
           <p:nvPr/>
         </p:nvCxnSpPr>
         <p:spPr>
           <a:xfrm rot="16200000" flipH="1">
-            <a:off x="5645585" y="4455028"/>
-            <a:ext cx="1967676" cy="1576501"/>
+            <a:off x="5894581" y="4206033"/>
+            <a:ext cx="1967790" cy="2074606"/>
           </a:xfrm>
           <a:prstGeom prst="curvedConnector3">
             <a:avLst/>

</xml_diff>